<commit_message>
adding assignment 2.3 and updating file scheme
</commit_message>
<xml_diff>
--- a/restful-api-presentations-simpson/assignment-1.3-simpson.pptx
+++ b/restful-api-presentations-simpson/assignment-1.3-simpson.pptx
@@ -207,7 +207,7 @@
           <a:p>
             <a:fld id="{71BD4573-58E7-4156-A133-2731F5F8D1A6}" type="datetimeFigureOut">
               <a:rPr lang="en-US" smtClean="0"/>
-              <a:t>5/2/2018</a:t>
+              <a:t>5/12/2018</a:t>
             </a:fld>
             <a:endParaRPr lang="en-US"/>
           </a:p>
@@ -872,7 +872,7 @@
           <a:p>
             <a:fld id="{021A1D30-C0A0-4124-A783-34D9F15FA0FE}" type="datetime1">
               <a:rPr lang="en-US" smtClean="0"/>
-              <a:t>5/2/2018</a:t>
+              <a:t>5/12/2018</a:t>
             </a:fld>
             <a:endParaRPr lang="en-US"/>
           </a:p>
@@ -1056,7 +1056,7 @@
           <a:p>
             <a:fld id="{8D2D5871-AB0F-4B3D-8861-97E78CB7B47E}" type="datetime1">
               <a:rPr lang="en-US" smtClean="0"/>
-              <a:t>5/2/2018</a:t>
+              <a:t>5/12/2018</a:t>
             </a:fld>
             <a:endParaRPr lang="en-US"/>
           </a:p>
@@ -1250,7 +1250,7 @@
           <a:p>
             <a:fld id="{14418406-4C3F-4F3E-80BD-A22568EA37EB}" type="datetime1">
               <a:rPr lang="en-US" smtClean="0"/>
-              <a:t>5/2/2018</a:t>
+              <a:t>5/12/2018</a:t>
             </a:fld>
             <a:endParaRPr lang="en-US"/>
           </a:p>
@@ -1434,7 +1434,7 @@
           <a:p>
             <a:fld id="{65F28077-7188-48C5-8679-2287FAC952E9}" type="datetime1">
               <a:rPr lang="en-US" smtClean="0"/>
-              <a:t>5/2/2018</a:t>
+              <a:t>5/12/2018</a:t>
             </a:fld>
             <a:endParaRPr lang="en-US"/>
           </a:p>
@@ -1681,7 +1681,7 @@
           <a:p>
             <a:fld id="{D2DCB740-6776-4EE9-99FD-96D592FA5A23}" type="datetime1">
               <a:rPr lang="en-US" smtClean="0"/>
-              <a:t>5/2/2018</a:t>
+              <a:t>5/12/2018</a:t>
             </a:fld>
             <a:endParaRPr lang="en-US"/>
           </a:p>
@@ -1964,7 +1964,7 @@
           <a:p>
             <a:fld id="{05F6BD99-6FFD-46C5-B5E2-43A34BDA2566}" type="datetime1">
               <a:rPr lang="en-US" smtClean="0"/>
-              <a:t>5/2/2018</a:t>
+              <a:t>5/12/2018</a:t>
             </a:fld>
             <a:endParaRPr lang="en-US"/>
           </a:p>
@@ -2361,7 +2361,7 @@
           <a:p>
             <a:fld id="{E022678E-214C-4CF8-97C7-95015FB02960}" type="datetime1">
               <a:rPr lang="en-US" smtClean="0"/>
-              <a:t>5/2/2018</a:t>
+              <a:t>5/12/2018</a:t>
             </a:fld>
             <a:endParaRPr lang="en-US"/>
           </a:p>
@@ -2530,7 +2530,7 @@
           <a:p>
             <a:fld id="{D55660E0-FA77-4473-A859-74127B089143}" type="datetime1">
               <a:rPr lang="en-US" smtClean="0"/>
-              <a:t>5/2/2018</a:t>
+              <a:t>5/12/2018</a:t>
             </a:fld>
             <a:endParaRPr lang="en-US"/>
           </a:p>
@@ -2640,7 +2640,7 @@
           <a:p>
             <a:fld id="{3188D7B8-9F07-4899-827D-5F3CFDDEB574}" type="datetime1">
               <a:rPr lang="en-US" smtClean="0"/>
-              <a:t>5/2/2018</a:t>
+              <a:t>5/12/2018</a:t>
             </a:fld>
             <a:endParaRPr lang="en-US"/>
           </a:p>
@@ -2920,7 +2920,7 @@
           <a:p>
             <a:fld id="{B5197C5C-1CD1-417D-A89C-14747F5222C7}" type="datetime1">
               <a:rPr lang="en-US" smtClean="0"/>
-              <a:t>5/2/2018</a:t>
+              <a:t>5/12/2018</a:t>
             </a:fld>
             <a:endParaRPr lang="en-US"/>
           </a:p>
@@ -3273,7 +3273,7 @@
           <a:p>
             <a:fld id="{1359EFBB-CFA1-4AA8-9123-F0B52DBD84FE}" type="datetime1">
               <a:rPr lang="en-US" smtClean="0"/>
-              <a:t>5/2/2018</a:t>
+              <a:t>5/12/2018</a:t>
             </a:fld>
             <a:endParaRPr lang="en-US"/>
           </a:p>
@@ -4307,7 +4307,7 @@
             <a:fld id="{61146459-E3C3-4969-9224-5ED50B492D17}" type="datetime1">
               <a:rPr lang="en-US" smtClean="0"/>
               <a:pPr/>
-              <a:t>5/2/2018</a:t>
+              <a:t>5/12/2018</a:t>
             </a:fld>
             <a:endParaRPr lang="en-US" dirty="0"/>
           </a:p>
@@ -4760,7 +4760,7 @@
           <a:p>
             <a:r>
               <a:rPr lang="en-US" dirty="0"/>
-              <a:t>REST</a:t>
+              <a:t>REST 2.2</a:t>
             </a:r>
           </a:p>
         </p:txBody>
@@ -4848,9 +4848,10 @@
           <a:lstStyle/>
           <a:p>
             <a:r>
-              <a:rPr lang="en-US" dirty="0"/>
-              <a:t>Stateless client/server protocol.</a:t>
-            </a:r>
+              <a:rPr lang="en-US"/>
+              <a:t>URI vs URL</a:t>
+            </a:r>
+            <a:endParaRPr lang="en-US" dirty="0"/>
           </a:p>
         </p:txBody>
       </p:sp>
@@ -5137,37 +5138,37 @@
           <a:p>
             <a:r>
               <a:rPr lang="en-US" dirty="0"/>
-              <a:t>Role in modern web applications</a:t>
+              <a:t>What are RESTful APIs?</a:t>
             </a:r>
           </a:p>
           <a:p>
             <a:r>
               <a:rPr lang="en-US" dirty="0"/>
-              <a:t>Relationships between HTTP and REST</a:t>
+              <a:t>How are they used?</a:t>
             </a:r>
           </a:p>
           <a:p>
             <a:r>
               <a:rPr lang="en-US" dirty="0"/>
-              <a:t>REST and its key features</a:t>
+              <a:t>Website Communication Example</a:t>
             </a:r>
           </a:p>
           <a:p>
             <a:r>
               <a:rPr lang="en-US" dirty="0"/>
-              <a:t>HTTP verbs</a:t>
+              <a:t>Advantages of RESTful APIs</a:t>
             </a:r>
           </a:p>
           <a:p>
             <a:r>
               <a:rPr lang="en-US" dirty="0"/>
-              <a:t>Stateless client/server protocol.</a:t>
+              <a:t>Disadvantages of RESTful APIs</a:t>
             </a:r>
           </a:p>
           <a:p>
             <a:r>
               <a:rPr lang="en-US" dirty="0"/>
-              <a:t>Resources</a:t>
+              <a:t>URI vs URL</a:t>
             </a:r>
           </a:p>
           <a:p>
@@ -5269,7 +5270,7 @@
             </a:pPr>
             <a:r>
               <a:rPr lang="en-US" dirty="0"/>
-              <a:t>This presentation is meant to give a broad understanding of the role that REST APIs have played in  the growth of web development, it will cover what REST is, what it can do, and why it is used.</a:t>
+              <a:t>This weeks’ presentation will delve further into RESTful APIs. We will begin to define what they really are, how they are used in the world, what advantages and disadvantages they provide, and what the differences between certain protocols.</a:t>
             </a:r>
           </a:p>
         </p:txBody>
@@ -5333,7 +5334,7 @@
           <a:p>
             <a:r>
               <a:rPr lang="en-US" dirty="0"/>
-              <a:t>Role in modern web applications</a:t>
+              <a:t>What are RESTful APIs?</a:t>
             </a:r>
           </a:p>
         </p:txBody>
@@ -5542,13 +5543,13 @@
         <p:spPr/>
         <p:txBody>
           <a:bodyPr>
-            <a:normAutofit fontScale="90000"/>
+            <a:normAutofit/>
           </a:bodyPr>
           <a:lstStyle/>
           <a:p>
             <a:r>
               <a:rPr lang="en-US" dirty="0"/>
-              <a:t>Relationships between HTTP and REST</a:t>
+              <a:t>How are they used?</a:t>
             </a:r>
           </a:p>
         </p:txBody>
@@ -5643,7 +5644,7 @@
           <a:p>
             <a:r>
               <a:rPr lang="en-US" dirty="0"/>
-              <a:t>REST and its key features</a:t>
+              <a:t>Website Communication Example</a:t>
             </a:r>
           </a:p>
         </p:txBody>
@@ -5756,7 +5757,7 @@
           <a:p>
             <a:r>
               <a:rPr lang="en-US" dirty="0"/>
-              <a:t>HTTP Verbs</a:t>
+              <a:t>Advantages of RESTful APIs</a:t>
             </a:r>
           </a:p>
         </p:txBody>
@@ -5859,14 +5860,19 @@
             <p:ph type="title"/>
           </p:nvPr>
         </p:nvSpPr>
-        <p:spPr/>
+        <p:spPr>
+          <a:xfrm>
+            <a:off x="609600" y="704088"/>
+            <a:ext cx="10972800" cy="1143000"/>
+          </a:xfrm>
+        </p:spPr>
         <p:txBody>
           <a:bodyPr/>
           <a:lstStyle/>
           <a:p>
             <a:r>
               <a:rPr lang="en-US" dirty="0"/>
-              <a:t>HTTP Verb Example</a:t>
+              <a:t>Disadvantages of RESTful APIs</a:t>
             </a:r>
           </a:p>
         </p:txBody>

</xml_diff>